<commit_message>
Update How to write a first draft.pptx
Change of gif
</commit_message>
<xml_diff>
--- a/How to write a first draft.pptx
+++ b/How to write a first draft.pptx
@@ -15,14 +15,15 @@
     <p:sldId id="259" r:id="rId9"/>
     <p:sldId id="262" r:id="rId10"/>
     <p:sldId id="260" r:id="rId11"/>
-    <p:sldId id="264" r:id="rId12"/>
-    <p:sldId id="273" r:id="rId13"/>
-    <p:sldId id="261" r:id="rId14"/>
-    <p:sldId id="263" r:id="rId15"/>
-    <p:sldId id="275" r:id="rId16"/>
-    <p:sldId id="269" r:id="rId17"/>
-    <p:sldId id="265" r:id="rId18"/>
-    <p:sldId id="267" r:id="rId19"/>
+    <p:sldId id="277" r:id="rId12"/>
+    <p:sldId id="278" r:id="rId13"/>
+    <p:sldId id="273" r:id="rId14"/>
+    <p:sldId id="261" r:id="rId15"/>
+    <p:sldId id="263" r:id="rId16"/>
+    <p:sldId id="275" r:id="rId17"/>
+    <p:sldId id="269" r:id="rId18"/>
+    <p:sldId id="265" r:id="rId19"/>
+    <p:sldId id="267" r:id="rId20"/>
   </p:sldIdLst>
   <p:sldSz cx="12192000" cy="6858000"/>
   <p:notesSz cx="6858000" cy="9144000"/>
@@ -851,7 +852,7 @@
           <a:p>
             <a:fld id="{B471556D-98F7-48AF-ABE6-F1BBFDB1AC6C}" type="datetimeFigureOut">
               <a:rPr lang="en-GB" smtClean="0"/>
-              <a:t>16/04/2025</a:t>
+              <a:t>23/04/2025</a:t>
             </a:fld>
             <a:endParaRPr lang="en-GB"/>
           </a:p>
@@ -1102,7 +1103,7 @@
           <a:p>
             <a:fld id="{B471556D-98F7-48AF-ABE6-F1BBFDB1AC6C}" type="datetimeFigureOut">
               <a:rPr lang="en-GB" smtClean="0"/>
-              <a:t>16/04/2025</a:t>
+              <a:t>23/04/2025</a:t>
             </a:fld>
             <a:endParaRPr lang="en-GB"/>
           </a:p>
@@ -1416,7 +1417,7 @@
           <a:p>
             <a:fld id="{B471556D-98F7-48AF-ABE6-F1BBFDB1AC6C}" type="datetimeFigureOut">
               <a:rPr lang="en-GB" smtClean="0"/>
-              <a:t>16/04/2025</a:t>
+              <a:t>23/04/2025</a:t>
             </a:fld>
             <a:endParaRPr lang="en-GB"/>
           </a:p>
@@ -1757,7 +1758,7 @@
           <a:p>
             <a:fld id="{B471556D-98F7-48AF-ABE6-F1BBFDB1AC6C}" type="datetimeFigureOut">
               <a:rPr lang="en-GB" smtClean="0"/>
-              <a:t>16/04/2025</a:t>
+              <a:t>23/04/2025</a:t>
             </a:fld>
             <a:endParaRPr lang="en-GB"/>
           </a:p>
@@ -2071,7 +2072,7 @@
           <a:p>
             <a:fld id="{B471556D-98F7-48AF-ABE6-F1BBFDB1AC6C}" type="datetimeFigureOut">
               <a:rPr lang="en-GB" smtClean="0"/>
-              <a:t>16/04/2025</a:t>
+              <a:t>23/04/2025</a:t>
             </a:fld>
             <a:endParaRPr lang="en-GB"/>
           </a:p>
@@ -2464,7 +2465,7 @@
           <a:p>
             <a:fld id="{B471556D-98F7-48AF-ABE6-F1BBFDB1AC6C}" type="datetimeFigureOut">
               <a:rPr lang="en-GB" smtClean="0"/>
-              <a:t>16/04/2025</a:t>
+              <a:t>23/04/2025</a:t>
             </a:fld>
             <a:endParaRPr lang="en-GB"/>
           </a:p>
@@ -2634,7 +2635,7 @@
           <a:p>
             <a:fld id="{B471556D-98F7-48AF-ABE6-F1BBFDB1AC6C}" type="datetimeFigureOut">
               <a:rPr lang="en-GB" smtClean="0"/>
-              <a:t>16/04/2025</a:t>
+              <a:t>23/04/2025</a:t>
             </a:fld>
             <a:endParaRPr lang="en-GB"/>
           </a:p>
@@ -2814,7 +2815,7 @@
           <a:p>
             <a:fld id="{B471556D-98F7-48AF-ABE6-F1BBFDB1AC6C}" type="datetimeFigureOut">
               <a:rPr lang="en-GB" smtClean="0"/>
-              <a:t>16/04/2025</a:t>
+              <a:t>23/04/2025</a:t>
             </a:fld>
             <a:endParaRPr lang="en-GB"/>
           </a:p>
@@ -2990,7 +2991,7 @@
           <a:p>
             <a:fld id="{B471556D-98F7-48AF-ABE6-F1BBFDB1AC6C}" type="datetimeFigureOut">
               <a:rPr lang="en-GB" smtClean="0"/>
-              <a:t>16/04/2025</a:t>
+              <a:t>23/04/2025</a:t>
             </a:fld>
             <a:endParaRPr lang="en-GB"/>
           </a:p>
@@ -3237,7 +3238,7 @@
           <a:p>
             <a:fld id="{B471556D-98F7-48AF-ABE6-F1BBFDB1AC6C}" type="datetimeFigureOut">
               <a:rPr lang="en-GB" smtClean="0"/>
-              <a:t>16/04/2025</a:t>
+              <a:t>23/04/2025</a:t>
             </a:fld>
             <a:endParaRPr lang="en-GB"/>
           </a:p>
@@ -3469,7 +3470,7 @@
           <a:p>
             <a:fld id="{B471556D-98F7-48AF-ABE6-F1BBFDB1AC6C}" type="datetimeFigureOut">
               <a:rPr lang="en-GB" smtClean="0"/>
-              <a:t>16/04/2025</a:t>
+              <a:t>23/04/2025</a:t>
             </a:fld>
             <a:endParaRPr lang="en-GB"/>
           </a:p>
@@ -3843,7 +3844,7 @@
           <a:p>
             <a:fld id="{B471556D-98F7-48AF-ABE6-F1BBFDB1AC6C}" type="datetimeFigureOut">
               <a:rPr lang="en-GB" smtClean="0"/>
-              <a:t>16/04/2025</a:t>
+              <a:t>23/04/2025</a:t>
             </a:fld>
             <a:endParaRPr lang="en-GB"/>
           </a:p>
@@ -3966,7 +3967,7 @@
           <a:p>
             <a:fld id="{B471556D-98F7-48AF-ABE6-F1BBFDB1AC6C}" type="datetimeFigureOut">
               <a:rPr lang="en-GB" smtClean="0"/>
-              <a:t>16/04/2025</a:t>
+              <a:t>23/04/2025</a:t>
             </a:fld>
             <a:endParaRPr lang="en-GB"/>
           </a:p>
@@ -4061,7 +4062,7 @@
           <a:p>
             <a:fld id="{B471556D-98F7-48AF-ABE6-F1BBFDB1AC6C}" type="datetimeFigureOut">
               <a:rPr lang="en-GB" smtClean="0"/>
-              <a:t>16/04/2025</a:t>
+              <a:t>23/04/2025</a:t>
             </a:fld>
             <a:endParaRPr lang="en-GB"/>
           </a:p>
@@ -4316,7 +4317,7 @@
           <a:p>
             <a:fld id="{B471556D-98F7-48AF-ABE6-F1BBFDB1AC6C}" type="datetimeFigureOut">
               <a:rPr lang="en-GB" smtClean="0"/>
-              <a:t>16/04/2025</a:t>
+              <a:t>23/04/2025</a:t>
             </a:fld>
             <a:endParaRPr lang="en-GB"/>
           </a:p>
@@ -4579,7 +4580,7 @@
           <a:p>
             <a:fld id="{B471556D-98F7-48AF-ABE6-F1BBFDB1AC6C}" type="datetimeFigureOut">
               <a:rPr lang="en-GB" smtClean="0"/>
-              <a:t>16/04/2025</a:t>
+              <a:t>23/04/2025</a:t>
             </a:fld>
             <a:endParaRPr lang="en-GB"/>
           </a:p>
@@ -5322,7 +5323,7 @@
           <a:p>
             <a:fld id="{B471556D-98F7-48AF-ABE6-F1BBFDB1AC6C}" type="datetimeFigureOut">
               <a:rPr lang="en-GB" smtClean="0"/>
-              <a:t>16/04/2025</a:t>
+              <a:t>23/04/2025</a:t>
             </a:fld>
             <a:endParaRPr lang="en-GB"/>
           </a:p>
@@ -6958,9 +6959,68 @@
           </a:p>
         </p:txBody>
       </p:sp>
+      <p:sp>
+        <p:nvSpPr>
+          <p:cNvPr id="3" name="Content Placeholder 2"/>
+          <p:cNvSpPr>
+            <a:spLocks noGrp="1"/>
+          </p:cNvSpPr>
+          <p:nvPr>
+            <p:ph idx="1"/>
+          </p:nvPr>
+        </p:nvSpPr>
+        <p:spPr>
+          <a:xfrm>
+            <a:off x="4295411" y="1930400"/>
+            <a:ext cx="3947471" cy="4747846"/>
+          </a:xfrm>
+        </p:spPr>
+        <p:txBody>
+          <a:bodyPr>
+            <a:normAutofit/>
+          </a:bodyPr>
+          <a:lstStyle/>
+          <a:p>
+            <a:r>
+              <a:rPr lang="fr-FR" sz="2400" dirty="0" err="1"/>
+              <a:t>References</a:t>
+            </a:r>
+            <a:r>
+              <a:rPr lang="fr-FR" sz="2400" dirty="0"/>
+              <a:t> </a:t>
+            </a:r>
+            <a:r>
+              <a:rPr lang="fr-FR" sz="2400" dirty="0" err="1"/>
+              <a:t>written</a:t>
+            </a:r>
+            <a:r>
+              <a:rPr lang="fr-FR" sz="2400" dirty="0"/>
+              <a:t> by hand</a:t>
+            </a:r>
+          </a:p>
+          <a:p>
+            <a:endParaRPr lang="fr-FR" sz="2400" dirty="0"/>
+          </a:p>
+          <a:p>
+            <a:endParaRPr lang="fr-FR" sz="2400" dirty="0"/>
+          </a:p>
+          <a:p>
+            <a:pPr marL="0" indent="0">
+              <a:buNone/>
+            </a:pPr>
+            <a:endParaRPr lang="fr-FR" sz="2400" dirty="0"/>
+          </a:p>
+        </p:txBody>
+      </p:sp>
       <p:pic>
         <p:nvPicPr>
-          <p:cNvPr id="4" name="Picture 3"/>
+          <p:cNvPr id="5" name="Image 4">
+            <a:extLst>
+              <a:ext uri="{FF2B5EF4-FFF2-40B4-BE49-F238E27FC236}">
+                <a16:creationId xmlns:a16="http://schemas.microsoft.com/office/drawing/2014/main" id="{14ADDEB9-2DD5-43B1-BEE4-656E1645E25E}"/>
+              </a:ext>
+            </a:extLst>
+          </p:cNvPr>
           <p:cNvPicPr>
             <a:picLocks noChangeAspect="1"/>
           </p:cNvPicPr>
@@ -6980,14 +7040,77 @@
         </p:blipFill>
         <p:spPr>
           <a:xfrm>
-            <a:off x="900022" y="1404848"/>
-            <a:ext cx="6096000" cy="5238750"/>
+            <a:off x="1708182" y="1658083"/>
+            <a:ext cx="2240937" cy="1994434"/>
           </a:xfrm>
           <a:prstGeom prst="rect">
             <a:avLst/>
           </a:prstGeom>
         </p:spPr>
       </p:pic>
+    </p:spTree>
+    <p:extLst>
+      <p:ext uri="{BB962C8B-B14F-4D97-AF65-F5344CB8AC3E}">
+        <p14:creationId xmlns:p14="http://schemas.microsoft.com/office/powerpoint/2010/main" val="3505149818"/>
+      </p:ext>
+    </p:extLst>
+  </p:cSld>
+  <p:clrMapOvr>
+    <a:masterClrMapping/>
+  </p:clrMapOvr>
+</p:sld>
+</file>
+
+<file path=ppt/slides/slide12.xml><?xml version="1.0" encoding="utf-8"?>
+<p:sld xmlns:a="http://schemas.openxmlformats.org/drawingml/2006/main" xmlns:r="http://schemas.openxmlformats.org/officeDocument/2006/relationships" xmlns:p="http://schemas.openxmlformats.org/presentationml/2006/main">
+  <p:cSld>
+    <p:spTree>
+      <p:nvGrpSpPr>
+        <p:cNvPr id="1" name=""/>
+        <p:cNvGrpSpPr/>
+        <p:nvPr/>
+      </p:nvGrpSpPr>
+      <p:grpSpPr>
+        <a:xfrm>
+          <a:off x="0" y="0"/>
+          <a:ext cx="0" cy="0"/>
+          <a:chOff x="0" y="0"/>
+          <a:chExt cx="0" cy="0"/>
+        </a:xfrm>
+      </p:grpSpPr>
+      <p:sp>
+        <p:nvSpPr>
+          <p:cNvPr id="2" name="Title 1"/>
+          <p:cNvSpPr>
+            <a:spLocks noGrp="1"/>
+          </p:cNvSpPr>
+          <p:nvPr>
+            <p:ph type="title"/>
+          </p:nvPr>
+        </p:nvSpPr>
+        <p:spPr/>
+        <p:txBody>
+          <a:bodyPr>
+            <a:normAutofit/>
+          </a:bodyPr>
+          <a:lstStyle/>
+          <a:p>
+            <a:r>
+              <a:rPr lang="fr-FR" sz="4400" dirty="0" err="1"/>
+              <a:t>Bibliography</a:t>
+            </a:r>
+            <a:r>
+              <a:rPr lang="fr-FR" sz="4400" dirty="0"/>
+              <a:t>/</a:t>
+            </a:r>
+            <a:r>
+              <a:rPr lang="fr-FR" sz="4400" dirty="0" err="1"/>
+              <a:t>references</a:t>
+            </a:r>
+            <a:endParaRPr lang="en-GB" sz="4400" dirty="0"/>
+          </a:p>
+        </p:txBody>
+      </p:sp>
       <p:sp>
         <p:nvSpPr>
           <p:cNvPr id="3" name="Content Placeholder 2"/>
@@ -7000,13 +7123,13 @@
         </p:nvSpPr>
         <p:spPr>
           <a:xfrm>
-            <a:off x="3948022" y="2083836"/>
-            <a:ext cx="3738174" cy="3880773"/>
+            <a:off x="4295411" y="1930400"/>
+            <a:ext cx="3947471" cy="4747846"/>
           </a:xfrm>
         </p:spPr>
         <p:txBody>
           <a:bodyPr>
-            <a:normAutofit fontScale="92500"/>
+            <a:normAutofit/>
           </a:bodyPr>
           <a:lstStyle/>
           <a:p>
@@ -7026,6 +7149,9 @@
               <a:rPr lang="fr-FR" sz="2400" dirty="0"/>
               <a:t> by hand</a:t>
             </a:r>
+          </a:p>
+          <a:p>
+            <a:endParaRPr lang="fr-FR" sz="2400" dirty="0"/>
           </a:p>
           <a:p>
             <a:endParaRPr lang="fr-FR" sz="2400" dirty="0"/>
@@ -7037,9 +7163,6 @@
             <a:endParaRPr lang="fr-FR" sz="2400" dirty="0"/>
           </a:p>
           <a:p>
-            <a:endParaRPr lang="fr-FR" sz="2400" dirty="0"/>
-          </a:p>
-          <a:p>
             <a:r>
               <a:rPr lang="fr-FR" sz="2400" dirty="0" err="1"/>
               <a:t>References</a:t>
@@ -7050,7 +7173,7 @@
             </a:r>
             <a:r>
               <a:rPr lang="fr-FR" sz="2400" dirty="0" err="1"/>
-              <a:t>written</a:t>
+              <a:t>managed</a:t>
             </a:r>
             <a:r>
               <a:rPr lang="fr-FR" sz="2400" dirty="0"/>
@@ -7062,7 +7185,7 @@
             </a:r>
             <a:r>
               <a:rPr lang="fr-FR" sz="2400" dirty="0"/>
-              <a:t> </a:t>
+              <a:t> a </a:t>
             </a:r>
             <a:r>
               <a:rPr lang="fr-FR" sz="2400" dirty="0" err="1"/>
@@ -7070,27 +7193,19 @@
             </a:r>
             <a:r>
               <a:rPr lang="fr-FR" sz="2400" dirty="0"/>
-              <a:t> software (</a:t>
+              <a:t> software (Zotero, </a:t>
+            </a:r>
+            <a:r>
+              <a:rPr lang="fr-FR" sz="2400" dirty="0" err="1"/>
+              <a:t>EndNote</a:t>
+            </a:r>
+            <a:r>
+              <a:rPr lang="fr-FR" sz="2400" dirty="0"/>
+              <a:t>, </a:t>
             </a:r>
             <a:r>
               <a:rPr lang="fr-FR" sz="2400" dirty="0" err="1"/>
               <a:t>Mendeley</a:t>
-            </a:r>
-            <a:r>
-              <a:rPr lang="fr-FR" sz="2400" dirty="0"/>
-              <a:t>, </a:t>
-            </a:r>
-            <a:r>
-              <a:rPr lang="fr-FR" sz="2400" dirty="0" err="1"/>
-              <a:t>EndNote</a:t>
-            </a:r>
-            <a:r>
-              <a:rPr lang="fr-FR" sz="2400" dirty="0"/>
-              <a:t>, </a:t>
-            </a:r>
-            <a:r>
-              <a:rPr lang="fr-FR" sz="2400" dirty="0" err="1"/>
-              <a:t>Zotero</a:t>
             </a:r>
             <a:r>
               <a:rPr lang="fr-FR" sz="2400" dirty="0"/>
@@ -7113,146 +7228,92 @@
           </a:p>
         </p:txBody>
       </p:sp>
-      <p:sp>
-        <p:nvSpPr>
-          <p:cNvPr id="5" name="Rectangle 4"/>
-          <p:cNvSpPr/>
+      <p:pic>
+        <p:nvPicPr>
+          <p:cNvPr id="11" name="Image 10">
+            <a:extLst>
+              <a:ext uri="{FF2B5EF4-FFF2-40B4-BE49-F238E27FC236}">
+                <a16:creationId xmlns:a16="http://schemas.microsoft.com/office/drawing/2014/main" id="{113CC2B7-FFD4-4B44-BFF9-723354161B1E}"/>
+              </a:ext>
+            </a:extLst>
+          </p:cNvPr>
+          <p:cNvPicPr>
+            <a:picLocks noChangeAspect="1"/>
+          </p:cNvPicPr>
           <p:nvPr/>
-        </p:nvSpPr>
+        </p:nvPicPr>
+        <p:blipFill>
+          <a:blip r:embed="rId2">
+            <a:extLst>
+              <a:ext uri="{28A0092B-C50C-407E-A947-70E740481C1C}">
+                <a14:useLocalDpi xmlns:a14="http://schemas.microsoft.com/office/drawing/2010/main" val="0"/>
+              </a:ext>
+            </a:extLst>
+          </a:blip>
+          <a:stretch>
+            <a:fillRect/>
+          </a:stretch>
+        </p:blipFill>
         <p:spPr>
           <a:xfrm>
-            <a:off x="677334" y="3842426"/>
-            <a:ext cx="7114521" cy="2937753"/>
+            <a:off x="1708183" y="3975677"/>
+            <a:ext cx="2240937" cy="2272723"/>
           </a:xfrm>
           <a:prstGeom prst="rect">
             <a:avLst/>
           </a:prstGeom>
-          <a:solidFill>
-            <a:schemeClr val="bg1"/>
-          </a:solidFill>
-          <a:ln>
-            <a:solidFill>
-              <a:schemeClr val="bg1"/>
-            </a:solidFill>
-          </a:ln>
         </p:spPr>
-        <p:style>
-          <a:lnRef idx="2">
-            <a:schemeClr val="accent1">
-              <a:shade val="50000"/>
-            </a:schemeClr>
-          </a:lnRef>
-          <a:fillRef idx="1">
-            <a:schemeClr val="accent1"/>
-          </a:fillRef>
-          <a:effectRef idx="0">
-            <a:schemeClr val="accent1"/>
-          </a:effectRef>
-          <a:fontRef idx="minor">
-            <a:schemeClr val="lt1"/>
-          </a:fontRef>
-        </p:style>
-        <p:txBody>
-          <a:bodyPr rtlCol="0" anchor="ctr"/>
-          <a:lstStyle/>
-          <a:p>
-            <a:pPr algn="ctr"/>
-            <a:endParaRPr lang="en-GB"/>
-          </a:p>
-        </p:txBody>
-      </p:sp>
+      </p:pic>
+      <p:pic>
+        <p:nvPicPr>
+          <p:cNvPr id="5" name="Image 4">
+            <a:extLst>
+              <a:ext uri="{FF2B5EF4-FFF2-40B4-BE49-F238E27FC236}">
+                <a16:creationId xmlns:a16="http://schemas.microsoft.com/office/drawing/2014/main" id="{14ADDEB9-2DD5-43B1-BEE4-656E1645E25E}"/>
+              </a:ext>
+            </a:extLst>
+          </p:cNvPr>
+          <p:cNvPicPr>
+            <a:picLocks noChangeAspect="1"/>
+          </p:cNvPicPr>
+          <p:nvPr/>
+        </p:nvPicPr>
+        <p:blipFill>
+          <a:blip r:embed="rId3">
+            <a:extLst>
+              <a:ext uri="{28A0092B-C50C-407E-A947-70E740481C1C}">
+                <a14:useLocalDpi xmlns:a14="http://schemas.microsoft.com/office/drawing/2010/main" val="0"/>
+              </a:ext>
+            </a:extLst>
+          </a:blip>
+          <a:stretch>
+            <a:fillRect/>
+          </a:stretch>
+        </p:blipFill>
+        <p:spPr>
+          <a:xfrm>
+            <a:off x="1708182" y="1658083"/>
+            <a:ext cx="2240937" cy="1994434"/>
+          </a:xfrm>
+          <a:prstGeom prst="rect">
+            <a:avLst/>
+          </a:prstGeom>
+        </p:spPr>
+      </p:pic>
     </p:spTree>
     <p:extLst>
       <p:ext uri="{BB962C8B-B14F-4D97-AF65-F5344CB8AC3E}">
-        <p14:creationId xmlns:p14="http://schemas.microsoft.com/office/powerpoint/2010/main" val="28610702"/>
+        <p14:creationId xmlns:p14="http://schemas.microsoft.com/office/powerpoint/2010/main" val="71844373"/>
       </p:ext>
     </p:extLst>
   </p:cSld>
   <p:clrMapOvr>
     <a:masterClrMapping/>
   </p:clrMapOvr>
-  <p:timing>
-    <p:tnLst>
-      <p:par>
-        <p:cTn id="1" dur="indefinite" restart="never" nodeType="tmRoot">
-          <p:childTnLst>
-            <p:seq concurrent="1" nextAc="seek">
-              <p:cTn id="2" dur="indefinite" nodeType="mainSeq">
-                <p:childTnLst>
-                  <p:par>
-                    <p:cTn id="3" fill="hold">
-                      <p:stCondLst>
-                        <p:cond delay="indefinite"/>
-                      </p:stCondLst>
-                      <p:childTnLst>
-                        <p:par>
-                          <p:cTn id="4" fill="hold">
-                            <p:stCondLst>
-                              <p:cond delay="0"/>
-                            </p:stCondLst>
-                            <p:childTnLst>
-                              <p:par>
-                                <p:cTn id="5" presetID="1" presetClass="exit" presetSubtype="0" fill="hold" grpId="0" nodeType="clickEffect">
-                                  <p:stCondLst>
-                                    <p:cond delay="0"/>
-                                  </p:stCondLst>
-                                  <p:childTnLst>
-                                    <p:set>
-                                      <p:cBhvr>
-                                        <p:cTn id="6" dur="1" fill="hold">
-                                          <p:stCondLst>
-                                            <p:cond delay="0"/>
-                                          </p:stCondLst>
-                                        </p:cTn>
-                                        <p:tgtEl>
-                                          <p:spTgt spid="5"/>
-                                        </p:tgtEl>
-                                        <p:attrNameLst>
-                                          <p:attrName>style.visibility</p:attrName>
-                                        </p:attrNameLst>
-                                      </p:cBhvr>
-                                      <p:to>
-                                        <p:strVal val="hidden"/>
-                                      </p:to>
-                                    </p:set>
-                                  </p:childTnLst>
-                                </p:cTn>
-                              </p:par>
-                            </p:childTnLst>
-                          </p:cTn>
-                        </p:par>
-                      </p:childTnLst>
-                    </p:cTn>
-                  </p:par>
-                </p:childTnLst>
-              </p:cTn>
-              <p:prevCondLst>
-                <p:cond evt="onPrev" delay="0">
-                  <p:tgtEl>
-                    <p:sldTgt/>
-                  </p:tgtEl>
-                </p:cond>
-              </p:prevCondLst>
-              <p:nextCondLst>
-                <p:cond evt="onNext" delay="0">
-                  <p:tgtEl>
-                    <p:sldTgt/>
-                  </p:tgtEl>
-                </p:cond>
-              </p:nextCondLst>
-            </p:seq>
-          </p:childTnLst>
-        </p:cTn>
-      </p:par>
-    </p:tnLst>
-    <p:bldLst>
-      <p:bldP spid="5" grpId="0" animBg="1"/>
-    </p:bldLst>
-  </p:timing>
 </p:sld>
 </file>
 
-<file path=ppt/slides/slide12.xml><?xml version="1.0" encoding="utf-8"?>
+<file path=ppt/slides/slide13.xml><?xml version="1.0" encoding="utf-8"?>
 <p:sld xmlns:a="http://schemas.openxmlformats.org/drawingml/2006/main" xmlns:r="http://schemas.openxmlformats.org/officeDocument/2006/relationships" xmlns:p="http://schemas.openxmlformats.org/presentationml/2006/main">
   <p:cSld>
     <p:spTree>
@@ -7353,7 +7414,7 @@
 </p:sld>
 </file>
 
-<file path=ppt/slides/slide13.xml><?xml version="1.0" encoding="utf-8"?>
+<file path=ppt/slides/slide14.xml><?xml version="1.0" encoding="utf-8"?>
 <p:sld xmlns:a="http://schemas.openxmlformats.org/drawingml/2006/main" xmlns:r="http://schemas.openxmlformats.org/officeDocument/2006/relationships" xmlns:p="http://schemas.openxmlformats.org/presentationml/2006/main">
   <p:cSld>
     <p:spTree>
@@ -8044,7 +8105,7 @@
 </p:sld>
 </file>
 
-<file path=ppt/slides/slide14.xml><?xml version="1.0" encoding="utf-8"?>
+<file path=ppt/slides/slide15.xml><?xml version="1.0" encoding="utf-8"?>
 <p:sld xmlns:a="http://schemas.openxmlformats.org/drawingml/2006/main" xmlns:r="http://schemas.openxmlformats.org/officeDocument/2006/relationships" xmlns:p="http://schemas.openxmlformats.org/presentationml/2006/main">
   <p:cSld>
     <p:spTree>
@@ -8629,7 +8690,7 @@
 </p:sld>
 </file>
 
-<file path=ppt/slides/slide15.xml><?xml version="1.0" encoding="utf-8"?>
+<file path=ppt/slides/slide16.xml><?xml version="1.0" encoding="utf-8"?>
 <p:sld xmlns:a="http://schemas.openxmlformats.org/drawingml/2006/main" xmlns:r="http://schemas.openxmlformats.org/officeDocument/2006/relationships" xmlns:p="http://schemas.openxmlformats.org/presentationml/2006/main">
   <p:cSld>
     <p:spTree>
@@ -9129,7 +9190,7 @@
 </p:sld>
 </file>
 
-<file path=ppt/slides/slide16.xml><?xml version="1.0" encoding="utf-8"?>
+<file path=ppt/slides/slide17.xml><?xml version="1.0" encoding="utf-8"?>
 <p:sld xmlns:a="http://schemas.openxmlformats.org/drawingml/2006/main" xmlns:r="http://schemas.openxmlformats.org/officeDocument/2006/relationships" xmlns:p="http://schemas.openxmlformats.org/presentationml/2006/main">
   <p:cSld>
     <p:spTree>
@@ -9744,7 +9805,7 @@
 </p:sld>
 </file>
 
-<file path=ppt/slides/slide17.xml><?xml version="1.0" encoding="utf-8"?>
+<file path=ppt/slides/slide18.xml><?xml version="1.0" encoding="utf-8"?>
 <p:sld xmlns:a="http://schemas.openxmlformats.org/drawingml/2006/main" xmlns:r="http://schemas.openxmlformats.org/officeDocument/2006/relationships" xmlns:p="http://schemas.openxmlformats.org/presentationml/2006/main">
   <p:cSld>
     <p:spTree>
@@ -11528,7 +11589,7 @@
 </p:sld>
 </file>
 
-<file path=ppt/slides/slide18.xml><?xml version="1.0" encoding="utf-8"?>
+<file path=ppt/slides/slide19.xml><?xml version="1.0" encoding="utf-8"?>
 <p:sld xmlns:a="http://schemas.openxmlformats.org/drawingml/2006/main" xmlns:r="http://schemas.openxmlformats.org/officeDocument/2006/relationships" xmlns:p="http://schemas.openxmlformats.org/presentationml/2006/main">
   <p:cSld>
     <p:spTree>

</xml_diff>